<commit_message>
Add G.711.1 to docx
</commit_message>
<xml_diff>
--- a/images/imagenes_seminario.pptx
+++ b/images/imagenes_seminario.pptx
@@ -16,6 +16,7 @@
     <p:sldId id="267" r:id="rId10"/>
     <p:sldId id="263" r:id="rId11"/>
     <p:sldId id="265" r:id="rId12"/>
+    <p:sldId id="268" r:id="rId13"/>
   </p:sldIdLst>
   <p:sldSz cx="9144000" cy="6858000" type="screen4x3"/>
   <p:notesSz cx="6858000" cy="9144000"/>
@@ -314,7 +315,7 @@
           <a:p>
             <a:fld id="{297D2723-5660-4AF4-AF5E-18D58290C35E}" type="datetimeFigureOut">
               <a:rPr lang="es-VE" smtClean="0"/>
-              <a:t>24/11/2016</a:t>
+              <a:t>25/11/2016</a:t>
             </a:fld>
             <a:endParaRPr lang="es-VE"/>
           </a:p>
@@ -484,7 +485,7 @@
           <a:p>
             <a:fld id="{297D2723-5660-4AF4-AF5E-18D58290C35E}" type="datetimeFigureOut">
               <a:rPr lang="es-VE" smtClean="0"/>
-              <a:t>24/11/2016</a:t>
+              <a:t>25/11/2016</a:t>
             </a:fld>
             <a:endParaRPr lang="es-VE"/>
           </a:p>
@@ -664,7 +665,7 @@
           <a:p>
             <a:fld id="{297D2723-5660-4AF4-AF5E-18D58290C35E}" type="datetimeFigureOut">
               <a:rPr lang="es-VE" smtClean="0"/>
-              <a:t>24/11/2016</a:t>
+              <a:t>25/11/2016</a:t>
             </a:fld>
             <a:endParaRPr lang="es-VE"/>
           </a:p>
@@ -834,7 +835,7 @@
           <a:p>
             <a:fld id="{297D2723-5660-4AF4-AF5E-18D58290C35E}" type="datetimeFigureOut">
               <a:rPr lang="es-VE" smtClean="0"/>
-              <a:t>24/11/2016</a:t>
+              <a:t>25/11/2016</a:t>
             </a:fld>
             <a:endParaRPr lang="es-VE"/>
           </a:p>
@@ -1080,7 +1081,7 @@
           <a:p>
             <a:fld id="{297D2723-5660-4AF4-AF5E-18D58290C35E}" type="datetimeFigureOut">
               <a:rPr lang="es-VE" smtClean="0"/>
-              <a:t>24/11/2016</a:t>
+              <a:t>25/11/2016</a:t>
             </a:fld>
             <a:endParaRPr lang="es-VE"/>
           </a:p>
@@ -1368,7 +1369,7 @@
           <a:p>
             <a:fld id="{297D2723-5660-4AF4-AF5E-18D58290C35E}" type="datetimeFigureOut">
               <a:rPr lang="es-VE" smtClean="0"/>
-              <a:t>24/11/2016</a:t>
+              <a:t>25/11/2016</a:t>
             </a:fld>
             <a:endParaRPr lang="es-VE"/>
           </a:p>
@@ -1790,7 +1791,7 @@
           <a:p>
             <a:fld id="{297D2723-5660-4AF4-AF5E-18D58290C35E}" type="datetimeFigureOut">
               <a:rPr lang="es-VE" smtClean="0"/>
-              <a:t>24/11/2016</a:t>
+              <a:t>25/11/2016</a:t>
             </a:fld>
             <a:endParaRPr lang="es-VE"/>
           </a:p>
@@ -1908,7 +1909,7 @@
           <a:p>
             <a:fld id="{297D2723-5660-4AF4-AF5E-18D58290C35E}" type="datetimeFigureOut">
               <a:rPr lang="es-VE" smtClean="0"/>
-              <a:t>24/11/2016</a:t>
+              <a:t>25/11/2016</a:t>
             </a:fld>
             <a:endParaRPr lang="es-VE"/>
           </a:p>
@@ -2003,7 +2004,7 @@
           <a:p>
             <a:fld id="{297D2723-5660-4AF4-AF5E-18D58290C35E}" type="datetimeFigureOut">
               <a:rPr lang="es-VE" smtClean="0"/>
-              <a:t>24/11/2016</a:t>
+              <a:t>25/11/2016</a:t>
             </a:fld>
             <a:endParaRPr lang="es-VE"/>
           </a:p>
@@ -2280,7 +2281,7 @@
           <a:p>
             <a:fld id="{297D2723-5660-4AF4-AF5E-18D58290C35E}" type="datetimeFigureOut">
               <a:rPr lang="es-VE" smtClean="0"/>
-              <a:t>24/11/2016</a:t>
+              <a:t>25/11/2016</a:t>
             </a:fld>
             <a:endParaRPr lang="es-VE"/>
           </a:p>
@@ -2533,7 +2534,7 @@
           <a:p>
             <a:fld id="{297D2723-5660-4AF4-AF5E-18D58290C35E}" type="datetimeFigureOut">
               <a:rPr lang="es-VE" smtClean="0"/>
-              <a:t>24/11/2016</a:t>
+              <a:t>25/11/2016</a:t>
             </a:fld>
             <a:endParaRPr lang="es-VE"/>
           </a:p>
@@ -2746,7 +2747,7 @@
           <a:p>
             <a:fld id="{297D2723-5660-4AF4-AF5E-18D58290C35E}" type="datetimeFigureOut">
               <a:rPr lang="es-VE" smtClean="0"/>
-              <a:t>24/11/2016</a:t>
+              <a:t>25/11/2016</a:t>
             </a:fld>
             <a:endParaRPr lang="es-VE"/>
           </a:p>
@@ -3348,6 +3349,82 @@
     <p:extLst>
       <p:ext uri="{BB962C8B-B14F-4D97-AF65-F5344CB8AC3E}">
         <p14:creationId xmlns:p14="http://schemas.microsoft.com/office/powerpoint/2010/main" val="2146513757"/>
+      </p:ext>
+    </p:extLst>
+  </p:cSld>
+  <p:clrMapOvr>
+    <a:masterClrMapping/>
+  </p:clrMapOvr>
+</p:sld>
+</file>
+
+<file path=ppt/slides/slide12.xml><?xml version="1.0" encoding="utf-8"?>
+<p:sld xmlns:a="http://schemas.openxmlformats.org/drawingml/2006/main" xmlns:r="http://schemas.openxmlformats.org/officeDocument/2006/relationships" xmlns:p="http://schemas.openxmlformats.org/presentationml/2006/main">
+  <p:cSld>
+    <p:spTree>
+      <p:nvGrpSpPr>
+        <p:cNvPr id="1" name=""/>
+        <p:cNvGrpSpPr/>
+        <p:nvPr/>
+      </p:nvGrpSpPr>
+      <p:grpSpPr>
+        <a:xfrm>
+          <a:off x="0" y="0"/>
+          <a:ext cx="0" cy="0"/>
+          <a:chOff x="0" y="0"/>
+          <a:chExt cx="0" cy="0"/>
+        </a:xfrm>
+      </p:grpSpPr>
+      <p:sp>
+        <p:nvSpPr>
+          <p:cNvPr id="2" name="Título 1"/>
+          <p:cNvSpPr>
+            <a:spLocks noGrp="1"/>
+          </p:cNvSpPr>
+          <p:nvPr>
+            <p:ph type="title"/>
+          </p:nvPr>
+        </p:nvSpPr>
+        <p:spPr/>
+        <p:txBody>
+          <a:bodyPr/>
+          <a:lstStyle/>
+          <a:p>
+            <a:r>
+              <a:rPr lang="es-VE" dirty="0"/>
+              <a:t>G.711.1</a:t>
+            </a:r>
+          </a:p>
+        </p:txBody>
+      </p:sp>
+      <p:pic>
+        <p:nvPicPr>
+          <p:cNvPr id="5" name="Imagen 4"/>
+          <p:cNvPicPr>
+            <a:picLocks noChangeAspect="1"/>
+          </p:cNvPicPr>
+          <p:nvPr/>
+        </p:nvPicPr>
+        <p:blipFill>
+          <a:blip r:embed="rId2"/>
+          <a:stretch>
+            <a:fillRect/>
+          </a:stretch>
+        </p:blipFill>
+        <p:spPr>
+          <a:xfrm>
+            <a:off x="0" y="1417638"/>
+            <a:ext cx="9144000" cy="5451711"/>
+          </a:xfrm>
+          <a:prstGeom prst="rect">
+            <a:avLst/>
+          </a:prstGeom>
+        </p:spPr>
+      </p:pic>
+    </p:spTree>
+    <p:extLst>
+      <p:ext uri="{BB962C8B-B14F-4D97-AF65-F5344CB8AC3E}">
+        <p14:creationId xmlns:p14="http://schemas.microsoft.com/office/powerpoint/2010/main" val="3414884923"/>
       </p:ext>
     </p:extLst>
   </p:cSld>

</xml_diff>